<commit_message>
Responses to Heidi and Sharon's comments (last week of July). This constitutes draft 2. 1. Figures have been removed from this document and made into separate files. 2. A preliminary list of specific action items has been outlined
</commit_message>
<xml_diff>
--- a/ILDB_figure2.pptx
+++ b/ILDB_figure2.pptx
@@ -192,7 +192,7 @@
           <a:p>
             <a:fld id="{2A432922-F082-7348-BD92-7B649A458C16}" type="datetimeFigureOut">
               <a:rPr lang="en-US" smtClean="0"/>
-              <a:t>7/26/15</a:t>
+              <a:t>8/3/15</a:t>
             </a:fld>
             <a:endParaRPr lang="en-US"/>
           </a:p>
@@ -504,6 +504,206 @@
           <a:bodyPr/>
           <a:lstStyle/>
           <a:p>
+            <a:pPr marL="0" marR="0" indent="0" algn="l" defTabSz="679093" rtl="0" eaLnBrk="1" fontAlgn="auto" latinLnBrk="0" hangingPunct="1">
+              <a:lnSpc>
+                <a:spcPct val="100000"/>
+              </a:lnSpc>
+              <a:spcBef>
+                <a:spcPts val="0"/>
+              </a:spcBef>
+              <a:spcAft>
+                <a:spcPts val="0"/>
+              </a:spcAft>
+              <a:buClrTx/>
+              <a:buSzTx/>
+              <a:buFontTx/>
+              <a:buNone/>
+              <a:tabLst/>
+              <a:defRPr/>
+            </a:pPr>
+            <a:r>
+              <a:rPr lang="en-US" sz="1800" b="0" kern="1200" dirty="0" smtClean="0">
+                <a:solidFill>
+                  <a:schemeClr val="tx1"/>
+                </a:solidFill>
+                <a:effectLst/>
+                <a:latin typeface="+mn-lt"/>
+                <a:ea typeface="+mn-ea"/>
+                <a:cs typeface="+mn-cs"/>
+              </a:rPr>
+              <a:t>Figure 1. This info-graphic shows the flow of genomic data from research-grade (left) and clinical-grade (right) samples through an interpretation process today, the relevant entities handling such data, and how the results of their interpretation trickle into the global scientific understanding of a disease’s molecular etiology. (A) A research study identifies and enrolls participants at the collaborating institutions’ sites, often over a period of years. Participants’ individual-level records (genotype data, phenotype data and relevant health data) typically have broad usage consent, and are subsequently aggregated into a central repository. (B) Disease-associated variants are revealed through genomic analyses on the dataset, (C, D) followed by a variant interpretation process, usually adjudicated by a panel of experts in the disease domain. However, such</a:t>
+            </a:r>
+            <a:r>
+              <a:rPr lang="en-US" sz="1800" b="0" kern="1200" baseline="0" dirty="0" smtClean="0">
+                <a:solidFill>
+                  <a:schemeClr val="tx1"/>
+                </a:solidFill>
+                <a:effectLst/>
+                <a:latin typeface="+mn-lt"/>
+                <a:ea typeface="+mn-ea"/>
+                <a:cs typeface="+mn-cs"/>
+              </a:rPr>
+              <a:t> expert interpretation is rare, and </a:t>
+            </a:r>
+            <a:r>
+              <a:rPr lang="en-US" sz="1800" b="0" kern="1200" dirty="0" smtClean="0">
+                <a:solidFill>
+                  <a:schemeClr val="tx1"/>
+                </a:solidFill>
+                <a:effectLst/>
+                <a:latin typeface="+mn-lt"/>
+                <a:ea typeface="+mn-ea"/>
+                <a:cs typeface="+mn-cs"/>
+              </a:rPr>
+              <a:t>more often than</a:t>
+            </a:r>
+            <a:r>
+              <a:rPr lang="en-US" sz="1800" b="0" kern="1200" baseline="0" dirty="0" smtClean="0">
+                <a:solidFill>
+                  <a:schemeClr val="tx1"/>
+                </a:solidFill>
+                <a:effectLst/>
+                <a:latin typeface="+mn-lt"/>
+                <a:ea typeface="+mn-ea"/>
+                <a:cs typeface="+mn-cs"/>
+              </a:rPr>
+              <a:t> not, variants will simply be annotated by </a:t>
+            </a:r>
+            <a:r>
+              <a:rPr lang="en-US" sz="1800" b="0" kern="1200" baseline="0" smtClean="0">
+                <a:solidFill>
+                  <a:schemeClr val="tx1"/>
+                </a:solidFill>
+                <a:effectLst/>
+                <a:latin typeface="+mn-lt"/>
+                <a:ea typeface="+mn-ea"/>
+                <a:cs typeface="+mn-cs"/>
+              </a:rPr>
+              <a:t>automated pipelines </a:t>
+            </a:r>
+            <a:r>
+              <a:rPr lang="en-US" sz="1800" b="0" kern="1200" smtClean="0">
+                <a:solidFill>
+                  <a:schemeClr val="tx1"/>
+                </a:solidFill>
+                <a:effectLst/>
+                <a:latin typeface="+mn-lt"/>
+                <a:ea typeface="+mn-ea"/>
+                <a:cs typeface="+mn-cs"/>
+              </a:rPr>
+              <a:t>(</a:t>
+            </a:r>
+            <a:r>
+              <a:rPr lang="en-US" sz="1800" b="0" kern="1200" dirty="0" smtClean="0">
+                <a:solidFill>
+                  <a:schemeClr val="tx1"/>
+                </a:solidFill>
+                <a:effectLst/>
+                <a:latin typeface="+mn-lt"/>
+                <a:ea typeface="+mn-ea"/>
+                <a:cs typeface="+mn-cs"/>
+              </a:rPr>
+              <a:t>E) Variants judged to be clinically significant are then submitted into databanks link </a:t>
+            </a:r>
+            <a:r>
+              <a:rPr lang="en-US" sz="1800" b="0" kern="1200" dirty="0" err="1" smtClean="0">
+                <a:solidFill>
+                  <a:schemeClr val="tx1"/>
+                </a:solidFill>
+                <a:effectLst/>
+                <a:latin typeface="+mn-lt"/>
+                <a:ea typeface="+mn-ea"/>
+                <a:cs typeface="+mn-cs"/>
+              </a:rPr>
+              <a:t>ClinVar</a:t>
+            </a:r>
+            <a:r>
+              <a:rPr lang="en-US" sz="1800" b="0" kern="1200" dirty="0" smtClean="0">
+                <a:solidFill>
+                  <a:schemeClr val="tx1"/>
+                </a:solidFill>
+                <a:effectLst/>
+                <a:latin typeface="+mn-lt"/>
+                <a:ea typeface="+mn-ea"/>
+                <a:cs typeface="+mn-cs"/>
+              </a:rPr>
+              <a:t>. (F) Any additional samples collected in the interim at the study centers can provide a boost to statistical power, and potentially reveal more disease-associated variants. This necessitates a reiteration through the entire analysis (A though F). Clinical testing laboratories are usually unable to contribute relevant patient samples due to privacy-related safeguards, and are left out of the process thus far. (G) Often, novel but suggestive variants – with no existing clinical interpretations – are observed in the patient samples of these labs. The amount of such “suggestive” variation might differ significantly from lab to lab, due to </a:t>
+            </a:r>
+            <a:r>
+              <a:rPr lang="en-US" sz="1800" b="0" i="1" kern="1200" dirty="0" smtClean="0">
+                <a:solidFill>
+                  <a:schemeClr val="tx1"/>
+                </a:solidFill>
+                <a:effectLst/>
+                <a:latin typeface="+mn-lt"/>
+                <a:ea typeface="+mn-ea"/>
+                <a:cs typeface="+mn-cs"/>
+              </a:rPr>
+              <a:t>bona-fide</a:t>
+            </a:r>
+            <a:r>
+              <a:rPr lang="en-US" sz="1800" b="0" kern="1200" dirty="0" smtClean="0">
+                <a:solidFill>
+                  <a:schemeClr val="tx1"/>
+                </a:solidFill>
+                <a:effectLst/>
+                <a:latin typeface="+mn-lt"/>
+                <a:ea typeface="+mn-ea"/>
+                <a:cs typeface="+mn-cs"/>
+              </a:rPr>
+              <a:t> factors like ethnic representation of patients in the region or number of samples processed by the lab, but also potentially due to </a:t>
+            </a:r>
+            <a:r>
+              <a:rPr lang="en-US" sz="1800" b="0" kern="1200" dirty="0" err="1" smtClean="0">
+                <a:solidFill>
+                  <a:schemeClr val="tx1"/>
+                </a:solidFill>
+                <a:effectLst/>
+                <a:latin typeface="+mn-lt"/>
+                <a:ea typeface="+mn-ea"/>
+                <a:cs typeface="+mn-cs"/>
+              </a:rPr>
+              <a:t>artefactual</a:t>
+            </a:r>
+            <a:r>
+              <a:rPr lang="en-US" sz="1800" b="0" kern="1200" dirty="0" smtClean="0">
+                <a:solidFill>
+                  <a:schemeClr val="tx1"/>
+                </a:solidFill>
+                <a:effectLst/>
+                <a:latin typeface="+mn-lt"/>
+                <a:ea typeface="+mn-ea"/>
+                <a:cs typeface="+mn-cs"/>
+              </a:rPr>
+              <a:t> causes like type of genetic testing technology used and batch-effects due to undiagnosed errors in sample processing. (H) Absent any framework to share patient records (on their contents) with the research community, testing labs maintain internal curation teams who are assigned the same task as disease domain experts. (I) Curation teams at each testing lab perform triage studies to interpret their own novel variants. Although best-practice recommendations are usually observed, pathogenicity assessment might differ significantly from lab to lab. (J) These custom interpretations are subsequently deposited into an internal repository of the testing lab, and might become part of its intellectual property. Unlike the lab’s overall curation process, individual interpretations rarely undergo rigorous peer-review. (K) Even if these interpretations are subsequently deposited into a community resource like </a:t>
+            </a:r>
+            <a:r>
+              <a:rPr lang="en-US" sz="1800" b="0" kern="1200" dirty="0" err="1" smtClean="0">
+                <a:solidFill>
+                  <a:schemeClr val="tx1"/>
+                </a:solidFill>
+                <a:effectLst/>
+                <a:latin typeface="+mn-lt"/>
+                <a:ea typeface="+mn-ea"/>
+                <a:cs typeface="+mn-cs"/>
+              </a:rPr>
+              <a:t>ClinVar</a:t>
+            </a:r>
+            <a:r>
+              <a:rPr lang="en-US" sz="1800" b="0" kern="1200" dirty="0" smtClean="0">
+                <a:solidFill>
+                  <a:schemeClr val="tx1"/>
+                </a:solidFill>
+                <a:effectLst/>
+                <a:latin typeface="+mn-lt"/>
+                <a:ea typeface="+mn-ea"/>
+                <a:cs typeface="+mn-cs"/>
+              </a:rPr>
+              <a:t>, without access to patient phenotype information and a better understanding of the process used to identify and annotate these variants at the depositing lab, significant hurdles remain in assessing their true merit. </a:t>
+            </a:r>
+            <a:endParaRPr lang="en-US" b="0" dirty="0" smtClean="0"/>
+          </a:p>
+          <a:p>
             <a:endParaRPr lang="en-US" dirty="0"/>
           </a:p>
         </p:txBody>
@@ -725,7 +925,7 @@
           <a:p>
             <a:fld id="{6645ED1F-917D-7B48-9C07-97991A6EC29D}" type="datetimeFigureOut">
               <a:rPr lang="en-US" smtClean="0"/>
-              <a:t>7/26/15</a:t>
+              <a:t>8/3/15</a:t>
             </a:fld>
             <a:endParaRPr lang="en-US"/>
           </a:p>
@@ -895,7 +1095,7 @@
           <a:p>
             <a:fld id="{6645ED1F-917D-7B48-9C07-97991A6EC29D}" type="datetimeFigureOut">
               <a:rPr lang="en-US" smtClean="0"/>
-              <a:t>7/26/15</a:t>
+              <a:t>8/3/15</a:t>
             </a:fld>
             <a:endParaRPr lang="en-US"/>
           </a:p>
@@ -1075,7 +1275,7 @@
           <a:p>
             <a:fld id="{6645ED1F-917D-7B48-9C07-97991A6EC29D}" type="datetimeFigureOut">
               <a:rPr lang="en-US" smtClean="0"/>
-              <a:t>7/26/15</a:t>
+              <a:t>8/3/15</a:t>
             </a:fld>
             <a:endParaRPr lang="en-US"/>
           </a:p>
@@ -1245,7 +1445,7 @@
           <a:p>
             <a:fld id="{6645ED1F-917D-7B48-9C07-97991A6EC29D}" type="datetimeFigureOut">
               <a:rPr lang="en-US" smtClean="0"/>
-              <a:t>7/26/15</a:t>
+              <a:t>8/3/15</a:t>
             </a:fld>
             <a:endParaRPr lang="en-US"/>
           </a:p>
@@ -1491,7 +1691,7 @@
           <a:p>
             <a:fld id="{6645ED1F-917D-7B48-9C07-97991A6EC29D}" type="datetimeFigureOut">
               <a:rPr lang="en-US" smtClean="0"/>
-              <a:t>7/26/15</a:t>
+              <a:t>8/3/15</a:t>
             </a:fld>
             <a:endParaRPr lang="en-US"/>
           </a:p>
@@ -1779,7 +1979,7 @@
           <a:p>
             <a:fld id="{6645ED1F-917D-7B48-9C07-97991A6EC29D}" type="datetimeFigureOut">
               <a:rPr lang="en-US" smtClean="0"/>
-              <a:t>7/26/15</a:t>
+              <a:t>8/3/15</a:t>
             </a:fld>
             <a:endParaRPr lang="en-US"/>
           </a:p>
@@ -2206,7 +2406,7 @@
           <a:p>
             <a:fld id="{6645ED1F-917D-7B48-9C07-97991A6EC29D}" type="datetimeFigureOut">
               <a:rPr lang="en-US" smtClean="0"/>
-              <a:t>7/26/15</a:t>
+              <a:t>8/3/15</a:t>
             </a:fld>
             <a:endParaRPr lang="en-US"/>
           </a:p>
@@ -2324,7 +2524,7 @@
           <a:p>
             <a:fld id="{6645ED1F-917D-7B48-9C07-97991A6EC29D}" type="datetimeFigureOut">
               <a:rPr lang="en-US" smtClean="0"/>
-              <a:t>7/26/15</a:t>
+              <a:t>8/3/15</a:t>
             </a:fld>
             <a:endParaRPr lang="en-US"/>
           </a:p>
@@ -2419,7 +2619,7 @@
           <a:p>
             <a:fld id="{6645ED1F-917D-7B48-9C07-97991A6EC29D}" type="datetimeFigureOut">
               <a:rPr lang="en-US" smtClean="0"/>
-              <a:t>7/26/15</a:t>
+              <a:t>8/3/15</a:t>
             </a:fld>
             <a:endParaRPr lang="en-US"/>
           </a:p>
@@ -2696,7 +2896,7 @@
           <a:p>
             <a:fld id="{6645ED1F-917D-7B48-9C07-97991A6EC29D}" type="datetimeFigureOut">
               <a:rPr lang="en-US" smtClean="0"/>
-              <a:t>7/26/15</a:t>
+              <a:t>8/3/15</a:t>
             </a:fld>
             <a:endParaRPr lang="en-US"/>
           </a:p>
@@ -2949,7 +3149,7 @@
           <a:p>
             <a:fld id="{6645ED1F-917D-7B48-9C07-97991A6EC29D}" type="datetimeFigureOut">
               <a:rPr lang="en-US" smtClean="0"/>
-              <a:t>7/26/15</a:t>
+              <a:t>8/3/15</a:t>
             </a:fld>
             <a:endParaRPr lang="en-US"/>
           </a:p>
@@ -3162,7 +3362,7 @@
           <a:p>
             <a:fld id="{6645ED1F-917D-7B48-9C07-97991A6EC29D}" type="datetimeFigureOut">
               <a:rPr lang="en-US" smtClean="0"/>
-              <a:t>7/26/15</a:t>
+              <a:t>8/3/15</a:t>
             </a:fld>
             <a:endParaRPr lang="en-US"/>
           </a:p>
@@ -3570,8 +3770,8 @@
         </p:nvSpPr>
         <p:spPr>
           <a:xfrm>
-            <a:off x="1847406" y="3357560"/>
-            <a:ext cx="595035" cy="461665"/>
+            <a:off x="1703628" y="3381523"/>
+            <a:ext cx="1070125" cy="646331"/>
           </a:xfrm>
           <a:prstGeom prst="rect">
             <a:avLst/>
@@ -3589,11 +3789,22 @@
               <a:rPr lang="en-US" sz="1200" dirty="0" smtClean="0"/>
               <a:t>Expert </a:t>
             </a:r>
-          </a:p>
-          <a:p>
             <a:r>
               <a:rPr lang="en-US" sz="1200" dirty="0" smtClean="0"/>
-              <a:t>Panel</a:t>
+              <a:t>Panel </a:t>
+            </a:r>
+            <a:br>
+              <a:rPr lang="en-US" sz="1200" dirty="0" smtClean="0"/>
+            </a:br>
+            <a:r>
+              <a:rPr lang="en-US" sz="1200" dirty="0" smtClean="0"/>
+              <a:t>Interpretation</a:t>
+            </a:r>
+          </a:p>
+          <a:p>
+            <a:r>
+              <a:rPr lang="en-US" sz="1200" dirty="0" smtClean="0"/>
+              <a:t>(rare)</a:t>
             </a:r>
             <a:endParaRPr lang="en-US" sz="1200" dirty="0"/>
           </a:p>
@@ -4140,7 +4351,6 @@
                 <a:rPr lang="en-US" sz="1200" dirty="0" smtClean="0"/>
                 <a:t>Literature</a:t>
               </a:r>
-              <a:endParaRPr lang="en-US" sz="1200" dirty="0" smtClean="0"/>
             </a:p>
           </p:txBody>
         </p:sp>
@@ -4221,6 +4431,7 @@
               </a:solidFill>
               <a:prstDash val="dash"/>
             </a:ln>
+            <a:effectLst/>
           </p:spPr>
           <p:style>
             <a:lnRef idx="1">
@@ -4324,11 +4535,7 @@
           <a:p>
             <a:r>
               <a:rPr lang="en-US" sz="1200" dirty="0" smtClean="0"/>
-              <a:t>Hospitals, Universities, </a:t>
-            </a:r>
-            <a:r>
-              <a:rPr lang="en-US" sz="1200" dirty="0" smtClean="0"/>
-              <a:t>Federal Institutes</a:t>
+              <a:t>Hospitals, Universities, Federal Institutes</a:t>
             </a:r>
             <a:endParaRPr lang="en-US" sz="1200" dirty="0"/>
           </a:p>
@@ -4398,20 +4605,12 @@
               <a:rPr lang="en-US" sz="1200" dirty="0" smtClean="0"/>
               <a:t>participant</a:t>
             </a:r>
-            <a:r>
-              <a:rPr lang="en-US" sz="1200" dirty="0" smtClean="0"/>
-              <a:t/>
-            </a:r>
             <a:br>
               <a:rPr lang="en-US" sz="1200" dirty="0" smtClean="0"/>
             </a:br>
             <a:r>
               <a:rPr lang="en-US" sz="1200" dirty="0" smtClean="0"/>
               <a:t>repository</a:t>
-            </a:r>
-            <a:r>
-              <a:rPr lang="en-US" sz="1200" dirty="0" smtClean="0"/>
-              <a:t/>
             </a:r>
             <a:br>
               <a:rPr lang="en-US" sz="1200" dirty="0" smtClean="0"/>
@@ -4459,16 +4658,11 @@
               <a:rPr lang="en-US" sz="1200" dirty="0" smtClean="0"/>
               <a:t>Clinical Genetic </a:t>
             </a:r>
-            <a:endParaRPr lang="en-US" sz="1200" dirty="0" smtClean="0"/>
           </a:p>
           <a:p>
             <a:r>
               <a:rPr lang="en-US" sz="1200" dirty="0" smtClean="0"/>
-              <a:t>Testing </a:t>
-            </a:r>
-            <a:r>
-              <a:rPr lang="en-US" sz="1200" dirty="0" smtClean="0"/>
-              <a:t>Labs</a:t>
+              <a:t>Testing Labs</a:t>
             </a:r>
             <a:endParaRPr lang="en-US" sz="1200" dirty="0"/>
           </a:p>
@@ -4573,23 +4767,7 @@
                     <a:srgbClr val="000000"/>
                   </a:solidFill>
                 </a:rPr>
-                <a:t>3 </a:t>
-              </a:r>
-              <a:r>
-                <a:rPr lang="en-US" sz="1200" baseline="30000" dirty="0" smtClean="0">
-                  <a:solidFill>
-                    <a:srgbClr val="000000"/>
-                  </a:solidFill>
-                </a:rPr>
-                <a:t>to </a:t>
-              </a:r>
-              <a:r>
-                <a:rPr lang="en-US" sz="1200" baseline="30000" dirty="0" smtClean="0">
-                  <a:solidFill>
-                    <a:srgbClr val="000000"/>
-                  </a:solidFill>
-                </a:rPr>
-                <a:t>4</a:t>
+                <a:t>3 to 4</a:t>
               </a:r>
               <a:endParaRPr lang="en-US" sz="1200" baseline="30000" dirty="0">
                 <a:solidFill>
@@ -5795,7 +5973,9 @@
           <p:nvPr/>
         </p:nvPicPr>
         <p:blipFill>
-          <a:blip r:embed="rId11"/>
+          <a:blip r:embed="rId11">
+            <a:alphaModFix amt="25000"/>
+          </a:blip>
           <a:stretch>
             <a:fillRect/>
           </a:stretch>
@@ -6361,11 +6541,7 @@
             </a:r>
             <a:r>
               <a:rPr lang="en-US" sz="1200" dirty="0" smtClean="0"/>
-              <a:t>epositorie</a:t>
-            </a:r>
-            <a:r>
-              <a:rPr lang="en-US" sz="1200" dirty="0" smtClean="0"/>
-              <a:t>s</a:t>
+              <a:t>epositories</a:t>
             </a:r>
             <a:endParaRPr lang="en-US" sz="1200" dirty="0"/>
           </a:p>
@@ -8545,7 +8721,6 @@
               <a:rPr lang="en-US" sz="1200" dirty="0" smtClean="0"/>
               <a:t>(with relevant metadata)</a:t>
             </a:r>
-            <a:endParaRPr lang="en-US" sz="1200" dirty="0" smtClean="0"/>
           </a:p>
         </p:txBody>
       </p:sp>

</xml_diff>